<commit_message>
Fill in theory sections of presentation
</commit_message>
<xml_diff>
--- a/LabMeeting.pptx
+++ b/LabMeeting.pptx
@@ -7,17 +7,20 @@
   <p:sldIdLst>
     <p:sldId id="256" r:id="rId2"/>
     <p:sldId id="258" r:id="rId3"/>
-    <p:sldId id="257" r:id="rId4"/>
-    <p:sldId id="259" r:id="rId5"/>
-    <p:sldId id="260" r:id="rId6"/>
-    <p:sldId id="261" r:id="rId7"/>
-    <p:sldId id="266" r:id="rId8"/>
-    <p:sldId id="262" r:id="rId9"/>
-    <p:sldId id="267" r:id="rId10"/>
-    <p:sldId id="268" r:id="rId11"/>
-    <p:sldId id="263" r:id="rId12"/>
-    <p:sldId id="264" r:id="rId13"/>
-    <p:sldId id="265" r:id="rId14"/>
+    <p:sldId id="259" r:id="rId4"/>
+    <p:sldId id="257" r:id="rId5"/>
+    <p:sldId id="269" r:id="rId6"/>
+    <p:sldId id="260" r:id="rId7"/>
+    <p:sldId id="270" r:id="rId8"/>
+    <p:sldId id="261" r:id="rId9"/>
+    <p:sldId id="266" r:id="rId10"/>
+    <p:sldId id="271" r:id="rId11"/>
+    <p:sldId id="262" r:id="rId12"/>
+    <p:sldId id="267" r:id="rId13"/>
+    <p:sldId id="268" r:id="rId14"/>
+    <p:sldId id="263" r:id="rId15"/>
+    <p:sldId id="264" r:id="rId16"/>
+    <p:sldId id="265" r:id="rId17"/>
   </p:sldIdLst>
   <p:sldSz cx="12192000" cy="6858000"/>
   <p:notesSz cx="6858000" cy="9144000"/>
@@ -127,15 +130,18 @@
         <p14:section name="Architecture" id="{F83F906E-46BF-A644-A618-6799D7870C23}">
           <p14:sldIdLst>
             <p14:sldId id="258"/>
+            <p14:sldId id="259"/>
             <p14:sldId id="257"/>
-            <p14:sldId id="259"/>
+            <p14:sldId id="269"/>
             <p14:sldId id="260"/>
+            <p14:sldId id="270"/>
           </p14:sldIdLst>
         </p14:section>
         <p14:section name="Semantic parsing" id="{8BC63A69-A109-2144-85E4-45E89BC1884D}">
           <p14:sldIdLst>
             <p14:sldId id="261"/>
             <p14:sldId id="266"/>
+            <p14:sldId id="271"/>
             <p14:sldId id="262"/>
           </p14:sldIdLst>
         </p14:section>
@@ -3109,47 +3115,391 @@
           <a:p>
             <a:r>
               <a:rPr lang="en-US" dirty="0" smtClean="0"/>
-              <a:t>World schema</a:t>
+              <a:t>Scoring</a:t>
             </a:r>
             <a:endParaRPr lang="en-US" dirty="0"/>
           </a:p>
         </p:txBody>
       </p:sp>
-      <p:sp>
-        <p:nvSpPr>
-          <p:cNvPr id="3" name="Content Placeholder 2"/>
-          <p:cNvSpPr>
-            <a:spLocks noGrp="1"/>
-          </p:cNvSpPr>
-          <p:nvPr>
-            <p:ph idx="1"/>
-          </p:nvPr>
-        </p:nvSpPr>
-        <p:spPr/>
-        <p:txBody>
-          <a:bodyPr/>
-          <a:lstStyle/>
-          <a:p>
-            <a:r>
-              <a:rPr lang="en-US" dirty="0" smtClean="0"/>
-              <a:t>Objects have height &amp; weight</a:t>
-            </a:r>
-          </a:p>
-          <a:p>
-            <a:r>
-              <a:rPr lang="en-US" dirty="0" smtClean="0"/>
-              <a:t>Different comparison classes</a:t>
-            </a:r>
-          </a:p>
-          <a:p>
-            <a:endParaRPr lang="en-US" dirty="0"/>
-          </a:p>
-        </p:txBody>
-      </p:sp>
+      <mc:AlternateContent xmlns:mc="http://schemas.openxmlformats.org/markup-compatibility/2006">
+        <mc:Choice xmlns:a14="http://schemas.microsoft.com/office/drawing/2010/main" Requires="a14">
+          <p:sp>
+            <p:nvSpPr>
+              <p:cNvPr id="3" name="Content Placeholder 2"/>
+              <p:cNvSpPr>
+                <a:spLocks noGrp="1"/>
+              </p:cNvSpPr>
+              <p:nvPr>
+                <p:ph idx="1"/>
+              </p:nvPr>
+            </p:nvSpPr>
+            <p:spPr/>
+            <p:txBody>
+              <a:bodyPr>
+                <a:normAutofit/>
+              </a:bodyPr>
+              <a:lstStyle/>
+              <a:p>
+                <a:r>
+                  <a:rPr lang="en-US" dirty="0" smtClean="0"/>
+                  <a:t>Feature function </a:t>
+                </a:r>
+                <a14:m>
+                  <m:oMath xmlns:m="http://schemas.openxmlformats.org/officeDocument/2006/math">
+                    <m:r>
+                      <a:rPr lang="en-US" b="0" i="1" smtClean="0">
+                        <a:latin typeface="Cambria Math" charset="0"/>
+                      </a:rPr>
+                      <m:t>𝜙</m:t>
+                    </m:r>
+                    <m:d>
+                      <m:dPr>
+                        <m:ctrlPr>
+                          <a:rPr lang="en-US" b="0" i="1" smtClean="0">
+                            <a:latin typeface="Cambria Math" charset="0"/>
+                          </a:rPr>
+                        </m:ctrlPr>
+                      </m:dPr>
+                      <m:e>
+                        <m:r>
+                          <a:rPr lang="en-US" b="0" i="1" smtClean="0">
+                            <a:latin typeface="Cambria Math" charset="0"/>
+                          </a:rPr>
+                          <m:t>𝑇</m:t>
+                        </m:r>
+                      </m:e>
+                    </m:d>
+                  </m:oMath>
+                </a14:m>
+                <a:r>
+                  <a:rPr lang="en-US" dirty="0" smtClean="0"/>
+                  <a:t> counts rules used in the tree T</a:t>
+                </a:r>
+              </a:p>
+              <a:p>
+                <a:endParaRPr lang="en-US" dirty="0" smtClean="0"/>
+              </a:p>
+              <a:p>
+                <a:r>
+                  <a:rPr lang="en-US" dirty="0" smtClean="0"/>
+                  <a:t>Score of tree T is </a:t>
+                </a:r>
+                <a14:m>
+                  <m:oMath xmlns:m="http://schemas.openxmlformats.org/officeDocument/2006/math">
+                    <m:r>
+                      <m:rPr>
+                        <m:sty m:val="p"/>
+                      </m:rPr>
+                      <a:rPr lang="en-US">
+                        <a:latin typeface="Cambria Math" charset="0"/>
+                      </a:rPr>
+                      <m:t>s</m:t>
+                    </m:r>
+                    <m:d>
+                      <m:dPr>
+                        <m:ctrlPr>
+                          <a:rPr lang="en-US" b="0" i="0" smtClean="0">
+                            <a:latin typeface="Cambria Math" charset="0"/>
+                          </a:rPr>
+                        </m:ctrlPr>
+                      </m:dPr>
+                      <m:e>
+                        <m:r>
+                          <m:rPr>
+                            <m:sty m:val="p"/>
+                          </m:rPr>
+                          <a:rPr lang="en-US" b="0" i="0" smtClean="0">
+                            <a:latin typeface="Cambria Math" charset="0"/>
+                          </a:rPr>
+                          <m:t>T</m:t>
+                        </m:r>
+                      </m:e>
+                    </m:d>
+                    <m:r>
+                      <a:rPr lang="en-US" b="0" i="0" smtClean="0">
+                        <a:latin typeface="Cambria Math" charset="0"/>
+                      </a:rPr>
+                      <m:t>=</m:t>
+                    </m:r>
+                    <m:r>
+                      <a:rPr lang="en-US" b="0" i="1" smtClean="0">
+                        <a:latin typeface="Cambria Math" charset="0"/>
+                      </a:rPr>
+                      <m:t>𝜔</m:t>
+                    </m:r>
+                    <m:r>
+                      <a:rPr lang="en-US" b="0" i="1" smtClean="0">
+                        <a:latin typeface="Cambria Math" charset="0"/>
+                      </a:rPr>
+                      <m:t>⋅</m:t>
+                    </m:r>
+                    <m:r>
+                      <a:rPr lang="en-US" b="0" i="1" smtClean="0">
+                        <a:latin typeface="Cambria Math" charset="0"/>
+                      </a:rPr>
+                      <m:t>𝜙</m:t>
+                    </m:r>
+                    <m:r>
+                      <a:rPr lang="en-US" b="0" i="1" smtClean="0">
+                        <a:latin typeface="Cambria Math" charset="0"/>
+                      </a:rPr>
+                      <m:t>(</m:t>
+                    </m:r>
+                    <m:r>
+                      <a:rPr lang="en-US" b="0" i="1" smtClean="0">
+                        <a:latin typeface="Cambria Math" charset="0"/>
+                      </a:rPr>
+                      <m:t>𝑇</m:t>
+                    </m:r>
+                    <m:r>
+                      <a:rPr lang="en-US" b="0" i="1" smtClean="0">
+                        <a:latin typeface="Cambria Math" charset="0"/>
+                      </a:rPr>
+                      <m:t>)</m:t>
+                    </m:r>
+                  </m:oMath>
+                </a14:m>
+                <a:endParaRPr lang="en-US" dirty="0" smtClean="0"/>
+              </a:p>
+              <a:p>
+                <a:endParaRPr lang="en-US" dirty="0"/>
+              </a:p>
+              <a:p>
+                <a:r>
+                  <a:rPr lang="en-US" dirty="0" smtClean="0"/>
+                  <a:t>Used to weight truth values of different trees</a:t>
+                </a:r>
+              </a:p>
+              <a:p>
+                <a:endParaRPr lang="en-US" dirty="0" smtClean="0"/>
+              </a:p>
+              <a:p>
+                <a14:m>
+                  <m:oMath xmlns:m="http://schemas.openxmlformats.org/officeDocument/2006/math">
+                    <m:sSup>
+                      <m:sSupPr>
+                        <m:ctrlPr>
+                          <a:rPr lang="en-US" b="0" i="1" smtClean="0">
+                            <a:latin typeface="Cambria Math" charset="0"/>
+                          </a:rPr>
+                        </m:ctrlPr>
+                      </m:sSupPr>
+                      <m:e>
+                        <m:d>
+                          <m:dPr>
+                            <m:begChr m:val="["/>
+                            <m:endChr m:val="]"/>
+                            <m:ctrlPr>
+                              <a:rPr lang="en-US" b="0" i="1" smtClean="0">
+                                <a:latin typeface="Cambria Math" charset="0"/>
+                              </a:rPr>
+                            </m:ctrlPr>
+                          </m:dPr>
+                          <m:e>
+                            <m:d>
+                              <m:dPr>
+                                <m:begChr m:val="["/>
+                                <m:endChr m:val="]"/>
+                                <m:ctrlPr>
+                                  <a:rPr lang="en-US" b="0" i="1" smtClean="0">
+                                    <a:latin typeface="Cambria Math" charset="0"/>
+                                  </a:rPr>
+                                </m:ctrlPr>
+                              </m:dPr>
+                              <m:e>
+                                <m:r>
+                                  <a:rPr lang="en-US" b="0" i="1" smtClean="0">
+                                    <a:latin typeface="Cambria Math" charset="0"/>
+                                  </a:rPr>
+                                  <m:t>𝑢</m:t>
+                                </m:r>
+                              </m:e>
+                            </m:d>
+                          </m:e>
+                        </m:d>
+                      </m:e>
+                      <m:sup>
+                        <m:r>
+                          <a:rPr lang="en-US" b="0" i="1" smtClean="0">
+                            <a:latin typeface="Cambria Math" charset="0"/>
+                          </a:rPr>
+                          <m:t>𝑤</m:t>
+                        </m:r>
+                      </m:sup>
+                    </m:sSup>
+                    <m:r>
+                      <a:rPr lang="en-US" b="0" i="1" smtClean="0">
+                        <a:latin typeface="Cambria Math" charset="0"/>
+                      </a:rPr>
+                      <m:t>=</m:t>
+                    </m:r>
+                    <m:nary>
+                      <m:naryPr>
+                        <m:chr m:val="∑"/>
+                        <m:supHide m:val="on"/>
+                        <m:ctrlPr>
+                          <a:rPr lang="en-US" b="0" i="1" smtClean="0">
+                            <a:latin typeface="Cambria Math" charset="0"/>
+                          </a:rPr>
+                        </m:ctrlPr>
+                      </m:naryPr>
+                      <m:sub>
+                        <m:r>
+                          <a:rPr lang="en-US" b="0" i="1" smtClean="0">
+                            <a:latin typeface="Cambria Math" charset="0"/>
+                          </a:rPr>
+                          <m:t>𝑇</m:t>
+                        </m:r>
+                      </m:sub>
+                      <m:sup/>
+                      <m:e>
+                        <m:sSup>
+                          <m:sSupPr>
+                            <m:ctrlPr>
+                              <a:rPr lang="en-US" b="0" i="1" smtClean="0">
+                                <a:latin typeface="Cambria Math" charset="0"/>
+                              </a:rPr>
+                            </m:ctrlPr>
+                          </m:sSupPr>
+                          <m:e>
+                            <m:r>
+                              <a:rPr lang="en-US" b="0" i="1" smtClean="0">
+                                <a:latin typeface="Cambria Math" charset="0"/>
+                              </a:rPr>
+                              <m:t>𝑒</m:t>
+                            </m:r>
+                          </m:e>
+                          <m:sup>
+                            <m:r>
+                              <a:rPr lang="en-US" b="0" i="1" smtClean="0">
+                                <a:latin typeface="Cambria Math" charset="0"/>
+                              </a:rPr>
+                              <m:t>𝑠</m:t>
+                            </m:r>
+                            <m:r>
+                              <a:rPr lang="en-US" b="0" i="1" smtClean="0">
+                                <a:latin typeface="Cambria Math" charset="0"/>
+                              </a:rPr>
+                              <m:t>(</m:t>
+                            </m:r>
+                            <m:r>
+                              <a:rPr lang="en-US" b="0" i="1" smtClean="0">
+                                <a:latin typeface="Cambria Math" charset="0"/>
+                              </a:rPr>
+                              <m:t>𝑇</m:t>
+                            </m:r>
+                            <m:r>
+                              <a:rPr lang="en-US" b="0" i="1" smtClean="0">
+                                <a:latin typeface="Cambria Math" charset="0"/>
+                              </a:rPr>
+                              <m:t>)</m:t>
+                            </m:r>
+                          </m:sup>
+                        </m:sSup>
+                        <m:sSup>
+                          <m:sSupPr>
+                            <m:ctrlPr>
+                              <a:rPr lang="en-US" b="0" i="1" smtClean="0">
+                                <a:latin typeface="Cambria Math" charset="0"/>
+                              </a:rPr>
+                            </m:ctrlPr>
+                          </m:sSupPr>
+                          <m:e>
+                            <m:d>
+                              <m:dPr>
+                                <m:begChr m:val="["/>
+                                <m:endChr m:val="]"/>
+                                <m:ctrlPr>
+                                  <a:rPr lang="en-US" b="0" i="1" smtClean="0">
+                                    <a:latin typeface="Cambria Math" charset="0"/>
+                                  </a:rPr>
+                                </m:ctrlPr>
+                              </m:dPr>
+                              <m:e>
+                                <m:d>
+                                  <m:dPr>
+                                    <m:begChr m:val="["/>
+                                    <m:endChr m:val="]"/>
+                                    <m:ctrlPr>
+                                      <a:rPr lang="en-US" b="0" i="1" smtClean="0">
+                                        <a:latin typeface="Cambria Math" charset="0"/>
+                                      </a:rPr>
+                                    </m:ctrlPr>
+                                  </m:dPr>
+                                  <m:e>
+                                    <m:r>
+                                      <a:rPr lang="en-US" b="0" i="1" smtClean="0">
+                                        <a:latin typeface="Cambria Math" charset="0"/>
+                                      </a:rPr>
+                                      <m:t>𝑇</m:t>
+                                    </m:r>
+                                  </m:e>
+                                </m:d>
+                              </m:e>
+                            </m:d>
+                          </m:e>
+                          <m:sup>
+                            <m:r>
+                              <a:rPr lang="en-US" b="0" i="1" smtClean="0">
+                                <a:latin typeface="Cambria Math" charset="0"/>
+                              </a:rPr>
+                              <m:t>𝑤</m:t>
+                            </m:r>
+                          </m:sup>
+                        </m:sSup>
+                        <m:r>
+                          <a:rPr lang="en-US" b="0" i="1" smtClean="0">
+                            <a:latin typeface="Cambria Math" charset="0"/>
+                          </a:rPr>
+                          <m:t> </m:t>
+                        </m:r>
+                      </m:e>
+                    </m:nary>
+                  </m:oMath>
+                </a14:m>
+                <a:endParaRPr lang="en-US" dirty="0"/>
+              </a:p>
+            </p:txBody>
+          </p:sp>
+        </mc:Choice>
+        <mc:Fallback>
+          <p:sp>
+            <p:nvSpPr>
+              <p:cNvPr id="3" name="Content Placeholder 2"/>
+              <p:cNvSpPr>
+                <a:spLocks noGrp="1" noRot="1" noChangeAspect="1" noMove="1" noResize="1" noEditPoints="1" noAdjustHandles="1" noChangeArrowheads="1" noChangeShapeType="1" noTextEdit="1"/>
+              </p:cNvSpPr>
+              <p:nvPr>
+                <p:ph idx="1"/>
+              </p:nvPr>
+            </p:nvSpPr>
+            <p:spPr>
+              <a:blipFill rotWithShape="0">
+                <a:blip r:embed="rId2"/>
+                <a:stretch>
+                  <a:fillRect l="-1043" t="-2241"/>
+                </a:stretch>
+              </a:blipFill>
+            </p:spPr>
+            <p:txBody>
+              <a:bodyPr/>
+              <a:lstStyle/>
+              <a:p>
+                <a:r>
+                  <a:rPr lang="en-US">
+                    <a:noFill/>
+                  </a:rPr>
+                  <a:t> </a:t>
+                </a:r>
+              </a:p>
+            </p:txBody>
+          </p:sp>
+        </mc:Fallback>
+      </mc:AlternateContent>
     </p:spTree>
     <p:extLst>
       <p:ext uri="{BB962C8B-B14F-4D97-AF65-F5344CB8AC3E}">
-        <p14:creationId xmlns:p14="http://schemas.microsoft.com/office/powerpoint/2010/main" val="38195056"/>
+        <p14:creationId xmlns:p14="http://schemas.microsoft.com/office/powerpoint/2010/main" val="917912282"/>
       </p:ext>
     </p:extLst>
   </p:cSld>
@@ -3193,7 +3543,7 @@
           <a:p>
             <a:r>
               <a:rPr lang="en-US" dirty="0" smtClean="0"/>
-              <a:t>Lexical experiments (learning scales)</a:t>
+              <a:t>Semantic functions (Leon’s slide)</a:t>
             </a:r>
             <a:endParaRPr lang="en-US" dirty="0"/>
           </a:p>
@@ -3214,14 +3564,14 @@
           <a:bodyPr/>
           <a:lstStyle/>
           <a:p>
-            <a:endParaRPr lang="en-US"/>
+            <a:endParaRPr lang="en-US" dirty="0"/>
           </a:p>
         </p:txBody>
       </p:sp>
     </p:spTree>
     <p:extLst>
       <p:ext uri="{BB962C8B-B14F-4D97-AF65-F5344CB8AC3E}">
-        <p14:creationId xmlns:p14="http://schemas.microsoft.com/office/powerpoint/2010/main" val="544191566"/>
+        <p14:creationId xmlns:p14="http://schemas.microsoft.com/office/powerpoint/2010/main" val="187102010"/>
       </p:ext>
     </p:extLst>
   </p:cSld>
@@ -3265,7 +3615,7 @@
           <a:p>
             <a:r>
               <a:rPr lang="en-US" dirty="0" smtClean="0"/>
-              <a:t>Lexical experiments (generalizing)</a:t>
+              <a:t>Data source</a:t>
             </a:r>
             <a:endParaRPr lang="en-US" dirty="0"/>
           </a:p>
@@ -3286,14 +3636,48 @@
           <a:bodyPr/>
           <a:lstStyle/>
           <a:p>
-            <a:endParaRPr lang="en-US"/>
+            <a:r>
+              <a:rPr lang="en-US" dirty="0" smtClean="0"/>
+              <a:t>Ground truth model – fixed semantics</a:t>
+            </a:r>
+          </a:p>
+          <a:p>
+            <a:r>
+              <a:rPr lang="en-US" dirty="0" smtClean="0"/>
+              <a:t>Generate samples from ground truth</a:t>
+            </a:r>
+          </a:p>
+          <a:p>
+            <a:r>
+              <a:rPr lang="en-US" dirty="0" smtClean="0"/>
+              <a:t>(not so important) Triples of utterance, world, context</a:t>
+            </a:r>
+          </a:p>
+          <a:p>
+            <a:r>
+              <a:rPr lang="en-US" dirty="0" err="1" smtClean="0"/>
+              <a:t>mapData</a:t>
+            </a:r>
+            <a:r>
+              <a:rPr lang="en-US" dirty="0" smtClean="0"/>
+              <a:t> in </a:t>
+            </a:r>
+            <a:r>
+              <a:rPr lang="en-US" dirty="0" err="1" smtClean="0"/>
+              <a:t>variational</a:t>
+            </a:r>
+            <a:r>
+              <a:rPr lang="en-US" dirty="0" smtClean="0"/>
+              <a:t> inference</a:t>
+            </a:r>
+            <a:endParaRPr lang="en-US" dirty="0"/>
           </a:p>
         </p:txBody>
       </p:sp>
     </p:spTree>
     <p:extLst>
       <p:ext uri="{BB962C8B-B14F-4D97-AF65-F5344CB8AC3E}">
-        <p14:creationId xmlns:p14="http://schemas.microsoft.com/office/powerpoint/2010/main" val="243653428"/>
+        <p14:creationId xmlns:p14="http://schemas.microsoft.com/office/powerpoint/2010/main" val="479382636"/>
       </p:ext>
     </p:extLst>
   </p:cSld>
@@ -3337,7 +3721,7 @@
           <a:p>
             <a:r>
               <a:rPr lang="en-US" dirty="0" smtClean="0"/>
-              <a:t>Learning grammar weights</a:t>
+              <a:t>World schema</a:t>
             </a:r>
             <a:endParaRPr lang="en-US" dirty="0"/>
           </a:p>
@@ -3358,7 +3742,272 @@
           <a:bodyPr/>
           <a:lstStyle/>
           <a:p>
-            <a:endParaRPr lang="en-US"/>
+            <a:r>
+              <a:rPr lang="en-US" dirty="0" smtClean="0"/>
+              <a:t>Objects have height &amp; weight</a:t>
+            </a:r>
+          </a:p>
+          <a:p>
+            <a:endParaRPr lang="en-US" dirty="0" smtClean="0"/>
+          </a:p>
+          <a:p>
+            <a:r>
+              <a:rPr lang="en-US" dirty="0" smtClean="0"/>
+              <a:t>Different comparison classes</a:t>
+            </a:r>
+          </a:p>
+          <a:p>
+            <a:pPr lvl="1"/>
+            <a:r>
+              <a:rPr lang="en-US" dirty="0" smtClean="0"/>
+              <a:t>People, buildings</a:t>
+            </a:r>
+          </a:p>
+          <a:p>
+            <a:pPr lvl="1"/>
+            <a:endParaRPr lang="en-US" dirty="0"/>
+          </a:p>
+        </p:txBody>
+      </p:sp>
+    </p:spTree>
+    <p:extLst>
+      <p:ext uri="{BB962C8B-B14F-4D97-AF65-F5344CB8AC3E}">
+        <p14:creationId xmlns:p14="http://schemas.microsoft.com/office/powerpoint/2010/main" val="38195056"/>
+      </p:ext>
+    </p:extLst>
+  </p:cSld>
+  <p:clrMapOvr>
+    <a:masterClrMapping/>
+  </p:clrMapOvr>
+</p:sld>
+</file>
+
+<file path=ppt/slides/slide14.xml><?xml version="1.0" encoding="utf-8"?>
+<p:sld xmlns:a="http://schemas.openxmlformats.org/drawingml/2006/main" xmlns:r="http://schemas.openxmlformats.org/officeDocument/2006/relationships" xmlns:p="http://schemas.openxmlformats.org/presentationml/2006/main">
+  <p:cSld>
+    <p:spTree>
+      <p:nvGrpSpPr>
+        <p:cNvPr id="1" name=""/>
+        <p:cNvGrpSpPr/>
+        <p:nvPr/>
+      </p:nvGrpSpPr>
+      <p:grpSpPr>
+        <a:xfrm>
+          <a:off x="0" y="0"/>
+          <a:ext cx="0" cy="0"/>
+          <a:chOff x="0" y="0"/>
+          <a:chExt cx="0" cy="0"/>
+        </a:xfrm>
+      </p:grpSpPr>
+      <p:sp>
+        <p:nvSpPr>
+          <p:cNvPr id="2" name="Title 1"/>
+          <p:cNvSpPr>
+            <a:spLocks noGrp="1"/>
+          </p:cNvSpPr>
+          <p:nvPr>
+            <p:ph type="title"/>
+          </p:nvPr>
+        </p:nvSpPr>
+        <p:spPr/>
+        <p:txBody>
+          <a:bodyPr/>
+          <a:lstStyle/>
+          <a:p>
+            <a:r>
+              <a:rPr lang="en-US" dirty="0" smtClean="0"/>
+              <a:t>Lexical experiments (learning scales)</a:t>
+            </a:r>
+            <a:endParaRPr lang="en-US" dirty="0"/>
+          </a:p>
+        </p:txBody>
+      </p:sp>
+      <p:sp>
+        <p:nvSpPr>
+          <p:cNvPr id="3" name="Content Placeholder 2"/>
+          <p:cNvSpPr>
+            <a:spLocks noGrp="1"/>
+          </p:cNvSpPr>
+          <p:nvPr>
+            <p:ph idx="1"/>
+          </p:nvPr>
+        </p:nvSpPr>
+        <p:spPr/>
+        <p:txBody>
+          <a:bodyPr/>
+          <a:lstStyle/>
+          <a:p>
+            <a:r>
+              <a:rPr lang="en-US" dirty="0" smtClean="0"/>
+              <a:t>Motivation: Can we learn the scale?</a:t>
+            </a:r>
+          </a:p>
+          <a:p>
+            <a:r>
+              <a:rPr lang="en-US" dirty="0" smtClean="0"/>
+              <a:t>Explain experiment</a:t>
+            </a:r>
+          </a:p>
+          <a:p>
+            <a:r>
+              <a:rPr lang="en-US" dirty="0" smtClean="0"/>
+              <a:t>Show ground truth distribution and learned distribution</a:t>
+            </a:r>
+            <a:endParaRPr lang="en-US" dirty="0"/>
+          </a:p>
+        </p:txBody>
+      </p:sp>
+    </p:spTree>
+    <p:extLst>
+      <p:ext uri="{BB962C8B-B14F-4D97-AF65-F5344CB8AC3E}">
+        <p14:creationId xmlns:p14="http://schemas.microsoft.com/office/powerpoint/2010/main" val="544191566"/>
+      </p:ext>
+    </p:extLst>
+  </p:cSld>
+  <p:clrMapOvr>
+    <a:masterClrMapping/>
+  </p:clrMapOvr>
+</p:sld>
+</file>
+
+<file path=ppt/slides/slide15.xml><?xml version="1.0" encoding="utf-8"?>
+<p:sld xmlns:a="http://schemas.openxmlformats.org/drawingml/2006/main" xmlns:r="http://schemas.openxmlformats.org/officeDocument/2006/relationships" xmlns:p="http://schemas.openxmlformats.org/presentationml/2006/main">
+  <p:cSld>
+    <p:spTree>
+      <p:nvGrpSpPr>
+        <p:cNvPr id="1" name=""/>
+        <p:cNvGrpSpPr/>
+        <p:nvPr/>
+      </p:nvGrpSpPr>
+      <p:grpSpPr>
+        <a:xfrm>
+          <a:off x="0" y="0"/>
+          <a:ext cx="0" cy="0"/>
+          <a:chOff x="0" y="0"/>
+          <a:chExt cx="0" cy="0"/>
+        </a:xfrm>
+      </p:grpSpPr>
+      <p:sp>
+        <p:nvSpPr>
+          <p:cNvPr id="2" name="Title 1"/>
+          <p:cNvSpPr>
+            <a:spLocks noGrp="1"/>
+          </p:cNvSpPr>
+          <p:nvPr>
+            <p:ph type="title"/>
+          </p:nvPr>
+        </p:nvSpPr>
+        <p:spPr/>
+        <p:txBody>
+          <a:bodyPr/>
+          <a:lstStyle/>
+          <a:p>
+            <a:r>
+              <a:rPr lang="en-US" dirty="0" smtClean="0"/>
+              <a:t>Lexical experiments (generalizing)</a:t>
+            </a:r>
+            <a:endParaRPr lang="en-US" dirty="0"/>
+          </a:p>
+        </p:txBody>
+      </p:sp>
+      <p:sp>
+        <p:nvSpPr>
+          <p:cNvPr id="3" name="Content Placeholder 2"/>
+          <p:cNvSpPr>
+            <a:spLocks noGrp="1"/>
+          </p:cNvSpPr>
+          <p:nvPr>
+            <p:ph idx="1"/>
+          </p:nvPr>
+        </p:nvSpPr>
+        <p:spPr/>
+        <p:txBody>
+          <a:bodyPr/>
+          <a:lstStyle/>
+          <a:p>
+            <a:endParaRPr lang="en-US"/>
+          </a:p>
+        </p:txBody>
+      </p:sp>
+    </p:spTree>
+    <p:extLst>
+      <p:ext uri="{BB962C8B-B14F-4D97-AF65-F5344CB8AC3E}">
+        <p14:creationId xmlns:p14="http://schemas.microsoft.com/office/powerpoint/2010/main" val="243653428"/>
+      </p:ext>
+    </p:extLst>
+  </p:cSld>
+  <p:clrMapOvr>
+    <a:masterClrMapping/>
+  </p:clrMapOvr>
+</p:sld>
+</file>
+
+<file path=ppt/slides/slide16.xml><?xml version="1.0" encoding="utf-8"?>
+<p:sld xmlns:a="http://schemas.openxmlformats.org/drawingml/2006/main" xmlns:r="http://schemas.openxmlformats.org/officeDocument/2006/relationships" xmlns:p="http://schemas.openxmlformats.org/presentationml/2006/main">
+  <p:cSld>
+    <p:spTree>
+      <p:nvGrpSpPr>
+        <p:cNvPr id="1" name=""/>
+        <p:cNvGrpSpPr/>
+        <p:nvPr/>
+      </p:nvGrpSpPr>
+      <p:grpSpPr>
+        <a:xfrm>
+          <a:off x="0" y="0"/>
+          <a:ext cx="0" cy="0"/>
+          <a:chOff x="0" y="0"/>
+          <a:chExt cx="0" cy="0"/>
+        </a:xfrm>
+      </p:grpSpPr>
+      <p:sp>
+        <p:nvSpPr>
+          <p:cNvPr id="2" name="Title 1"/>
+          <p:cNvSpPr>
+            <a:spLocks noGrp="1"/>
+          </p:cNvSpPr>
+          <p:nvPr>
+            <p:ph type="title"/>
+          </p:nvPr>
+        </p:nvSpPr>
+        <p:spPr/>
+        <p:txBody>
+          <a:bodyPr/>
+          <a:lstStyle/>
+          <a:p>
+            <a:r>
+              <a:rPr lang="en-US" dirty="0" smtClean="0"/>
+              <a:t>Learning semantic composition</a:t>
+            </a:r>
+            <a:endParaRPr lang="en-US" dirty="0"/>
+          </a:p>
+        </p:txBody>
+      </p:sp>
+      <p:sp>
+        <p:nvSpPr>
+          <p:cNvPr id="3" name="Content Placeholder 2"/>
+          <p:cNvSpPr>
+            <a:spLocks noGrp="1"/>
+          </p:cNvSpPr>
+          <p:nvPr>
+            <p:ph idx="1"/>
+          </p:nvPr>
+        </p:nvSpPr>
+        <p:spPr/>
+        <p:txBody>
+          <a:bodyPr/>
+          <a:lstStyle/>
+          <a:p>
+            <a:r>
+              <a:rPr lang="en-US" dirty="0" smtClean="0"/>
+              <a:t>Logical operators are implemented and experimented</a:t>
+            </a:r>
+          </a:p>
+          <a:p>
+            <a:r>
+              <a:rPr lang="en-US" dirty="0" smtClean="0"/>
+              <a:t>Modular to support other kinds of compositional rules </a:t>
+            </a:r>
+            <a:endParaRPr lang="en-US" dirty="0"/>
           </a:p>
         </p:txBody>
       </p:sp>
@@ -3431,12 +4080,30 @@
           <a:lstStyle/>
           <a:p>
             <a:r>
+              <a:rPr lang="en-US" dirty="0" smtClean="0"/>
+              <a:t>Semantic parser</a:t>
+            </a:r>
+          </a:p>
+          <a:p>
+            <a:endParaRPr lang="en-US" dirty="0"/>
+          </a:p>
+          <a:p>
+            <a:r>
+              <a:rPr lang="en-US" dirty="0" smtClean="0"/>
+              <a:t>RSA</a:t>
+            </a:r>
+          </a:p>
+          <a:p>
+            <a:endParaRPr lang="en-US" dirty="0"/>
+          </a:p>
+          <a:p>
+            <a:r>
               <a:rPr lang="en-US" dirty="0" err="1" smtClean="0"/>
               <a:t>Variational</a:t>
             </a:r>
             <a:r>
               <a:rPr lang="en-US" dirty="0" smtClean="0"/>
-              <a:t> inference at the top, then RSA, then semantic parser</a:t>
+              <a:t> Inference</a:t>
             </a:r>
             <a:endParaRPr lang="en-US" dirty="0"/>
           </a:p>
@@ -3489,7 +4156,7 @@
           <a:p>
             <a:r>
               <a:rPr lang="en-US" dirty="0" smtClean="0"/>
-              <a:t>RSA</a:t>
+              <a:t>Semantic parser interface</a:t>
             </a:r>
             <a:endParaRPr lang="en-US" dirty="0"/>
           </a:p>
@@ -3512,16 +4179,43 @@
           <a:p>
             <a:r>
               <a:rPr lang="en-US" dirty="0" smtClean="0"/>
-              <a:t>Show standard RSA model with listener, speaker, literal listener</a:t>
+              <a:t>Takes parameters to govern parsing</a:t>
             </a:r>
             <a:endParaRPr lang="en-US" dirty="0"/>
+          </a:p>
+          <a:p>
+            <a:endParaRPr lang="en-US" dirty="0" smtClean="0"/>
+          </a:p>
+          <a:p>
+            <a:r>
+              <a:rPr lang="en-US" dirty="0" smtClean="0"/>
+              <a:t>Takes utterance</a:t>
+            </a:r>
+          </a:p>
+          <a:p>
+            <a:endParaRPr lang="en-US" dirty="0"/>
+          </a:p>
+          <a:p>
+            <a:r>
+              <a:rPr lang="en-US" dirty="0" smtClean="0"/>
+              <a:t>Returns meaning function from worlds to truth values</a:t>
+            </a:r>
+          </a:p>
+          <a:p>
+            <a:endParaRPr lang="en-US" dirty="0"/>
+          </a:p>
+          <a:p>
+            <a:r>
+              <a:rPr lang="en-US" dirty="0" smtClean="0"/>
+              <a:t>Truth value is real number</a:t>
+            </a:r>
           </a:p>
         </p:txBody>
       </p:sp>
     </p:spTree>
     <p:extLst>
       <p:ext uri="{BB962C8B-B14F-4D97-AF65-F5344CB8AC3E}">
-        <p14:creationId xmlns:p14="http://schemas.microsoft.com/office/powerpoint/2010/main" val="1228214860"/>
+        <p14:creationId xmlns:p14="http://schemas.microsoft.com/office/powerpoint/2010/main" val="515934178"/>
       </p:ext>
     </p:extLst>
   </p:cSld>
@@ -3565,7 +4259,7 @@
           <a:p>
             <a:r>
               <a:rPr lang="en-US" dirty="0" smtClean="0"/>
-              <a:t>Semantic parser interface</a:t>
+              <a:t>RSA</a:t>
             </a:r>
             <a:endParaRPr lang="en-US" dirty="0"/>
           </a:p>
@@ -3588,15 +4282,30 @@
           <a:p>
             <a:r>
               <a:rPr lang="en-US" dirty="0" smtClean="0"/>
-              <a:t>Takes parameters from </a:t>
-            </a:r>
-            <a:r>
-              <a:rPr lang="en-US" dirty="0" err="1" smtClean="0"/>
-              <a:t>variational</a:t>
-            </a:r>
+              <a:t>Standard RSA setup</a:t>
+            </a:r>
+          </a:p>
+          <a:p>
+            <a:endParaRPr lang="en-US" dirty="0" smtClean="0"/>
+          </a:p>
+          <a:p>
             <a:r>
               <a:rPr lang="en-US" dirty="0" smtClean="0"/>
-              <a:t>, returns function from worlds to truth values, used in RSA</a:t>
+              <a:t>Literal listener calls semantic parser</a:t>
+            </a:r>
+          </a:p>
+          <a:p>
+            <a:pPr lvl="1"/>
+            <a:r>
+              <a:rPr lang="en-US" dirty="0" smtClean="0"/>
+              <a:t>Pass utterance to parser</a:t>
+            </a:r>
+          </a:p>
+          <a:p>
+            <a:pPr lvl="1"/>
+            <a:r>
+              <a:rPr lang="en-US" dirty="0" smtClean="0"/>
+              <a:t>Pass world to resulting meaning function</a:t>
             </a:r>
             <a:endParaRPr lang="en-US" dirty="0"/>
           </a:p>
@@ -3605,7 +4314,7 @@
     </p:spTree>
     <p:extLst>
       <p:ext uri="{BB962C8B-B14F-4D97-AF65-F5344CB8AC3E}">
-        <p14:creationId xmlns:p14="http://schemas.microsoft.com/office/powerpoint/2010/main" val="515934178"/>
+        <p14:creationId xmlns:p14="http://schemas.microsoft.com/office/powerpoint/2010/main" val="1228214860"/>
       </p:ext>
     </p:extLst>
   </p:cSld>
@@ -3648,12 +4357,8 @@
           <a:lstStyle/>
           <a:p>
             <a:r>
-              <a:rPr lang="en-US" dirty="0" err="1" smtClean="0"/>
-              <a:t>Variational</a:t>
-            </a:r>
-            <a:r>
               <a:rPr lang="en-US" dirty="0" smtClean="0"/>
-              <a:t> interface</a:t>
+              <a:t>RSA</a:t>
             </a:r>
             <a:endParaRPr lang="en-US" dirty="0"/>
           </a:p>
@@ -3661,39 +4366,222 @@
       </p:sp>
       <p:sp>
         <p:nvSpPr>
-          <p:cNvPr id="3" name="Content Placeholder 2"/>
-          <p:cNvSpPr>
-            <a:spLocks noGrp="1"/>
-          </p:cNvSpPr>
-          <p:nvPr>
-            <p:ph idx="1"/>
-          </p:nvPr>
-        </p:nvSpPr>
-        <p:spPr/>
-        <p:txBody>
-          <a:bodyPr/>
-          <a:lstStyle/>
-          <a:p>
-            <a:r>
-              <a:rPr lang="en-US" dirty="0" smtClean="0"/>
-              <a:t>Show </a:t>
-            </a:r>
-            <a:r>
-              <a:rPr lang="en-US" dirty="0" err="1" smtClean="0"/>
-              <a:t>variational</a:t>
-            </a:r>
-            <a:r>
-              <a:rPr lang="en-US" dirty="0" smtClean="0"/>
-              <a:t> interacting with pragmatic listener</a:t>
-            </a:r>
-            <a:endParaRPr lang="en-US" dirty="0"/>
+          <p:cNvPr id="6" name="TextBox 5"/>
+          <p:cNvSpPr txBox="1"/>
+          <p:nvPr/>
+        </p:nvSpPr>
+        <p:spPr>
+          <a:xfrm>
+            <a:off x="3482787" y="2260382"/>
+            <a:ext cx="6535271" cy="3416320"/>
+          </a:xfrm>
+          <a:prstGeom prst="rect">
+            <a:avLst/>
+          </a:prstGeom>
+          <a:noFill/>
+        </p:spPr>
+        <p:txBody>
+          <a:bodyPr wrap="square" rtlCol="0">
+            <a:spAutoFit/>
+          </a:bodyPr>
+          <a:lstStyle/>
+          <a:p>
+            <a:r>
+              <a:rPr lang="en-US" sz="2400" dirty="0" err="1" smtClean="0"/>
+              <a:t>var</a:t>
+            </a:r>
+            <a:r>
+              <a:rPr lang="en-US" sz="2400" dirty="0" smtClean="0"/>
+              <a:t> </a:t>
+            </a:r>
+            <a:r>
+              <a:rPr lang="en-US" sz="2400" dirty="0" smtClean="0">
+                <a:solidFill>
+                  <a:srgbClr val="FF0000"/>
+                </a:solidFill>
+              </a:rPr>
+              <a:t>parser</a:t>
+            </a:r>
+            <a:r>
+              <a:rPr lang="en-US" sz="2400" dirty="0" smtClean="0"/>
+              <a:t> = </a:t>
+            </a:r>
+            <a:r>
+              <a:rPr lang="en-US" sz="2400" dirty="0" err="1" smtClean="0"/>
+              <a:t>createParser</a:t>
+            </a:r>
+            <a:r>
+              <a:rPr lang="en-US" sz="2400" dirty="0" smtClean="0"/>
+              <a:t>(</a:t>
+            </a:r>
+            <a:r>
+              <a:rPr lang="en-US" sz="2400" dirty="0" err="1" smtClean="0"/>
+              <a:t>params</a:t>
+            </a:r>
+            <a:r>
+              <a:rPr lang="en-US" sz="2400" dirty="0" smtClean="0"/>
+              <a:t>);</a:t>
+            </a:r>
+          </a:p>
+          <a:p>
+            <a:r>
+              <a:rPr lang="en-US" sz="2400" dirty="0" err="1" smtClean="0"/>
+              <a:t>var</a:t>
+            </a:r>
+            <a:r>
+              <a:rPr lang="en-US" sz="2400" dirty="0" smtClean="0"/>
+              <a:t> </a:t>
+            </a:r>
+            <a:r>
+              <a:rPr lang="en-US" sz="2400" dirty="0" err="1" smtClean="0"/>
+              <a:t>literalListener</a:t>
+            </a:r>
+            <a:r>
+              <a:rPr lang="en-US" sz="2400" dirty="0" smtClean="0"/>
+              <a:t> = function (utterance) {        </a:t>
+            </a:r>
+          </a:p>
+          <a:p>
+            <a:r>
+              <a:rPr lang="en-US" sz="2400" dirty="0" smtClean="0"/>
+              <a:t>    Infer({ method: 'enumerate' }, function () {            </a:t>
+            </a:r>
+          </a:p>
+          <a:p>
+            <a:r>
+              <a:rPr lang="en-US" sz="2400" dirty="0" smtClean="0"/>
+              <a:t>        </a:t>
+            </a:r>
+            <a:r>
+              <a:rPr lang="en-US" sz="2400" dirty="0" err="1" smtClean="0"/>
+              <a:t>var</a:t>
+            </a:r>
+            <a:r>
+              <a:rPr lang="en-US" sz="2400" dirty="0" smtClean="0"/>
+              <a:t> </a:t>
+            </a:r>
+            <a:r>
+              <a:rPr lang="en-US" sz="2400" dirty="0" err="1" smtClean="0">
+                <a:solidFill>
+                  <a:srgbClr val="0070C0"/>
+                </a:solidFill>
+              </a:rPr>
+              <a:t>truthFn</a:t>
+            </a:r>
+            <a:r>
+              <a:rPr lang="en-US" sz="2400" dirty="0" smtClean="0">
+                <a:solidFill>
+                  <a:srgbClr val="0070C0"/>
+                </a:solidFill>
+              </a:rPr>
+              <a:t> </a:t>
+            </a:r>
+            <a:r>
+              <a:rPr lang="en-US" sz="2400" dirty="0" smtClean="0"/>
+              <a:t>= </a:t>
+            </a:r>
+            <a:r>
+              <a:rPr lang="en-US" sz="2400" dirty="0" smtClean="0">
+                <a:solidFill>
+                  <a:srgbClr val="FF0000"/>
+                </a:solidFill>
+              </a:rPr>
+              <a:t>parser</a:t>
+            </a:r>
+            <a:r>
+              <a:rPr lang="en-US" sz="2400" dirty="0" smtClean="0"/>
+              <a:t>(utterance);</a:t>
+            </a:r>
+          </a:p>
+          <a:p>
+            <a:r>
+              <a:rPr lang="en-US" sz="2400" dirty="0"/>
+              <a:t> </a:t>
+            </a:r>
+            <a:r>
+              <a:rPr lang="en-US" sz="2400" dirty="0" smtClean="0"/>
+              <a:t>       </a:t>
+            </a:r>
+            <a:r>
+              <a:rPr lang="en-US" sz="2400" dirty="0" err="1" smtClean="0"/>
+              <a:t>var</a:t>
+            </a:r>
+            <a:r>
+              <a:rPr lang="en-US" sz="2400" dirty="0" smtClean="0"/>
+              <a:t> world = </a:t>
+            </a:r>
+            <a:r>
+              <a:rPr lang="en-US" sz="2400" dirty="0" err="1" smtClean="0"/>
+              <a:t>worldPrior</a:t>
+            </a:r>
+            <a:r>
+              <a:rPr lang="en-US" sz="2400" dirty="0" smtClean="0"/>
+              <a:t>();</a:t>
+            </a:r>
+          </a:p>
+          <a:p>
+            <a:r>
+              <a:rPr lang="en-US" sz="2400" dirty="0"/>
+              <a:t> </a:t>
+            </a:r>
+            <a:r>
+              <a:rPr lang="en-US" sz="2400" dirty="0" smtClean="0"/>
+              <a:t>       factor(</a:t>
+            </a:r>
+            <a:r>
+              <a:rPr lang="en-US" sz="2400" dirty="0" err="1" smtClean="0"/>
+              <a:t>Math.log</a:t>
+            </a:r>
+            <a:r>
+              <a:rPr lang="en-US" sz="2400" dirty="0" smtClean="0"/>
+              <a:t>(</a:t>
+            </a:r>
+            <a:r>
+              <a:rPr lang="en-US" sz="2400" dirty="0" err="1" smtClean="0">
+                <a:solidFill>
+                  <a:srgbClr val="0070C0"/>
+                </a:solidFill>
+              </a:rPr>
+              <a:t>truthFn</a:t>
+            </a:r>
+            <a:r>
+              <a:rPr lang="en-US" sz="2400" dirty="0" smtClean="0"/>
+              <a:t>(world)));</a:t>
+            </a:r>
+          </a:p>
+          <a:p>
+            <a:r>
+              <a:rPr lang="en-US" sz="2400" dirty="0"/>
+              <a:t> </a:t>
+            </a:r>
+            <a:r>
+              <a:rPr lang="en-US" sz="2400" dirty="0" smtClean="0"/>
+              <a:t>       return world;</a:t>
+            </a:r>
+          </a:p>
+          <a:p>
+            <a:r>
+              <a:rPr lang="en-US" sz="2400" dirty="0"/>
+              <a:t> </a:t>
+            </a:r>
+            <a:r>
+              <a:rPr lang="en-US" sz="2400" dirty="0" smtClean="0"/>
+              <a:t>   })   </a:t>
+            </a:r>
+          </a:p>
+          <a:p>
+            <a:r>
+              <a:rPr lang="en-US" sz="2400" dirty="0" smtClean="0"/>
+              <a:t>})</a:t>
+            </a:r>
+            <a:endParaRPr lang="en-US" sz="2400" dirty="0"/>
           </a:p>
         </p:txBody>
       </p:sp>
     </p:spTree>
     <p:extLst>
       <p:ext uri="{BB962C8B-B14F-4D97-AF65-F5344CB8AC3E}">
-        <p14:creationId xmlns:p14="http://schemas.microsoft.com/office/powerpoint/2010/main" val="238419957"/>
+        <p14:creationId xmlns:p14="http://schemas.microsoft.com/office/powerpoint/2010/main" val="250962427"/>
       </p:ext>
     </p:extLst>
   </p:cSld>
@@ -3736,8 +4624,12 @@
           <a:lstStyle/>
           <a:p>
             <a:r>
+              <a:rPr lang="en-US" dirty="0" err="1" smtClean="0"/>
+              <a:t>Variational</a:t>
+            </a:r>
+            <a:r>
               <a:rPr lang="en-US" dirty="0" smtClean="0"/>
-              <a:t>Semantic parser architecture</a:t>
+              <a:t> Inference</a:t>
             </a:r>
             <a:endParaRPr lang="en-US" dirty="0"/>
           </a:p>
@@ -3760,33 +4652,30 @@
           <a:p>
             <a:r>
               <a:rPr lang="en-US" dirty="0" smtClean="0"/>
-              <a:t>Probabilistic semantics</a:t>
-            </a:r>
+              <a:t>Goal: optimize parser parameters</a:t>
+            </a:r>
+          </a:p>
+          <a:p>
+            <a:endParaRPr lang="en-US" dirty="0" smtClean="0"/>
           </a:p>
           <a:p>
             <a:r>
               <a:rPr lang="en-US" dirty="0" smtClean="0"/>
-              <a:t>Chart parsing – compacted versus </a:t>
-            </a:r>
+              <a:t>Training data contains worlds and utterances</a:t>
+            </a:r>
+          </a:p>
+          <a:p>
+            <a:endParaRPr lang="en-US" dirty="0"/>
+          </a:p>
+          <a:p>
             <a:r>
               <a:rPr lang="en-US" dirty="0" err="1" smtClean="0"/>
-              <a:t>uncompacted</a:t>
-            </a:r>
-            <a:endParaRPr lang="en-US" dirty="0" smtClean="0"/>
-          </a:p>
-          <a:p>
+              <a:t>mapData</a:t>
+            </a:r>
             <a:r>
               <a:rPr lang="en-US" dirty="0" smtClean="0"/>
-              <a:t>PCFG – learns weights, each cell has a set of trees with cumulative scores</a:t>
-            </a:r>
-          </a:p>
-          <a:p>
-            <a:r>
-              <a:rPr lang="en-US" dirty="0" smtClean="0"/>
-              <a:t>Log-linear scoring with features for each rule</a:t>
-            </a:r>
-          </a:p>
-          <a:p>
+              <a:t> calls pragmatic listener</a:t>
+            </a:r>
             <a:endParaRPr lang="en-US" dirty="0"/>
           </a:p>
         </p:txBody>
@@ -3794,7 +4683,7 @@
     </p:spTree>
     <p:extLst>
       <p:ext uri="{BB962C8B-B14F-4D97-AF65-F5344CB8AC3E}">
-        <p14:creationId xmlns:p14="http://schemas.microsoft.com/office/powerpoint/2010/main" val="1867923418"/>
+        <p14:creationId xmlns:p14="http://schemas.microsoft.com/office/powerpoint/2010/main" val="238419957"/>
       </p:ext>
     </p:extLst>
   </p:cSld>
@@ -3837,8 +4726,12 @@
           <a:lstStyle/>
           <a:p>
             <a:r>
+              <a:rPr lang="en-US" dirty="0" err="1" smtClean="0"/>
+              <a:t>Variational</a:t>
+            </a:r>
+            <a:r>
               <a:rPr lang="en-US" dirty="0" smtClean="0"/>
-              <a:t>Grammar specification</a:t>
+              <a:t> Inference</a:t>
             </a:r>
             <a:endParaRPr lang="en-US" dirty="0"/>
           </a:p>
@@ -3846,27 +4739,223 @@
       </p:sp>
       <p:sp>
         <p:nvSpPr>
-          <p:cNvPr id="3" name="Content Placeholder 2"/>
-          <p:cNvSpPr>
-            <a:spLocks noGrp="1"/>
-          </p:cNvSpPr>
-          <p:nvPr>
-            <p:ph idx="1"/>
-          </p:nvPr>
-        </p:nvSpPr>
-        <p:spPr/>
-        <p:txBody>
-          <a:bodyPr/>
-          <a:lstStyle/>
-          <a:p>
-            <a:endParaRPr lang="en-US"/>
+          <p:cNvPr id="4" name="TextBox 3"/>
+          <p:cNvSpPr txBox="1"/>
+          <p:nvPr/>
+        </p:nvSpPr>
+        <p:spPr>
+          <a:xfrm>
+            <a:off x="3240741" y="2266623"/>
+            <a:ext cx="5997388" cy="3416320"/>
+          </a:xfrm>
+          <a:prstGeom prst="rect">
+            <a:avLst/>
+          </a:prstGeom>
+          <a:noFill/>
+        </p:spPr>
+        <p:txBody>
+          <a:bodyPr wrap="square" rtlCol="0">
+            <a:spAutoFit/>
+          </a:bodyPr>
+          <a:lstStyle/>
+          <a:p>
+            <a:r>
+              <a:rPr lang="en-US" sz="2400" dirty="0" smtClean="0"/>
+              <a:t>Optimize(function () {</a:t>
+            </a:r>
+          </a:p>
+          <a:p>
+            <a:r>
+              <a:rPr lang="en-US" sz="2400" dirty="0"/>
+              <a:t> </a:t>
+            </a:r>
+            <a:r>
+              <a:rPr lang="en-US" sz="2400" dirty="0" smtClean="0"/>
+              <a:t>   </a:t>
+            </a:r>
+            <a:r>
+              <a:rPr lang="en-US" sz="2400" dirty="0" err="1" smtClean="0"/>
+              <a:t>var</a:t>
+            </a:r>
+            <a:r>
+              <a:rPr lang="en-US" sz="2400" dirty="0" smtClean="0"/>
+              <a:t> </a:t>
+            </a:r>
+            <a:r>
+              <a:rPr lang="en-US" sz="2400" dirty="0" err="1" smtClean="0">
+                <a:solidFill>
+                  <a:srgbClr val="0070C0"/>
+                </a:solidFill>
+              </a:rPr>
+              <a:t>params</a:t>
+            </a:r>
+            <a:r>
+              <a:rPr lang="en-US" sz="2400" dirty="0" smtClean="0">
+                <a:solidFill>
+                  <a:srgbClr val="0070C0"/>
+                </a:solidFill>
+              </a:rPr>
+              <a:t> </a:t>
+            </a:r>
+            <a:r>
+              <a:rPr lang="en-US" sz="2400" dirty="0" smtClean="0"/>
+              <a:t>= </a:t>
+            </a:r>
+            <a:r>
+              <a:rPr lang="is-IS" sz="2400" dirty="0" smtClean="0"/>
+              <a:t>… // Calls modelParam</a:t>
+            </a:r>
+          </a:p>
+          <a:p>
+            <a:r>
+              <a:rPr lang="en-US" sz="2400" dirty="0" smtClean="0"/>
+              <a:t>    </a:t>
+            </a:r>
+            <a:r>
+              <a:rPr lang="en-US" sz="2400" dirty="0" err="1" smtClean="0"/>
+              <a:t>var</a:t>
+            </a:r>
+            <a:r>
+              <a:rPr lang="en-US" sz="2400" dirty="0" smtClean="0"/>
+              <a:t> </a:t>
+            </a:r>
+            <a:r>
+              <a:rPr lang="en-US" sz="2400" dirty="0" smtClean="0">
+                <a:solidFill>
+                  <a:srgbClr val="FF0000"/>
+                </a:solidFill>
+              </a:rPr>
+              <a:t>listener</a:t>
+            </a:r>
+            <a:r>
+              <a:rPr lang="en-US" sz="2400" dirty="0" smtClean="0"/>
+              <a:t> = </a:t>
+            </a:r>
+            <a:r>
+              <a:rPr lang="en-US" sz="2400" dirty="0" err="1" smtClean="0"/>
+              <a:t>createListener</a:t>
+            </a:r>
+            <a:r>
+              <a:rPr lang="en-US" sz="2400" dirty="0" smtClean="0"/>
+              <a:t>(</a:t>
+            </a:r>
+            <a:r>
+              <a:rPr lang="en-US" sz="2400" dirty="0" err="1" smtClean="0">
+                <a:solidFill>
+                  <a:srgbClr val="0070C0"/>
+                </a:solidFill>
+              </a:rPr>
+              <a:t>params</a:t>
+            </a:r>
+            <a:r>
+              <a:rPr lang="en-US" sz="2400" dirty="0" smtClean="0"/>
+              <a:t>);</a:t>
+            </a:r>
+          </a:p>
+          <a:p>
+            <a:r>
+              <a:rPr lang="en-US" sz="2400" dirty="0"/>
+              <a:t> </a:t>
+            </a:r>
+            <a:r>
+              <a:rPr lang="en-US" sz="2400" dirty="0" smtClean="0"/>
+              <a:t>   </a:t>
+            </a:r>
+            <a:r>
+              <a:rPr lang="en-US" sz="2400" dirty="0" err="1" smtClean="0"/>
+              <a:t>mapData</a:t>
+            </a:r>
+            <a:r>
+              <a:rPr lang="en-US" sz="2400" dirty="0" smtClean="0"/>
+              <a:t>({ data: data }, function (d) {</a:t>
+            </a:r>
+          </a:p>
+          <a:p>
+            <a:r>
+              <a:rPr lang="en-US" sz="2400" dirty="0"/>
+              <a:t> </a:t>
+            </a:r>
+            <a:r>
+              <a:rPr lang="en-US" sz="2400" dirty="0" smtClean="0"/>
+              <a:t>       </a:t>
+            </a:r>
+            <a:r>
+              <a:rPr lang="en-US" sz="2400" dirty="0" err="1" smtClean="0"/>
+              <a:t>var</a:t>
+            </a:r>
+            <a:r>
+              <a:rPr lang="en-US" sz="2400" dirty="0" smtClean="0"/>
+              <a:t> distribution = </a:t>
+            </a:r>
+            <a:r>
+              <a:rPr lang="en-US" sz="2400" dirty="0" smtClean="0">
+                <a:solidFill>
+                  <a:srgbClr val="FF0000"/>
+                </a:solidFill>
+              </a:rPr>
+              <a:t>listener</a:t>
+            </a:r>
+            <a:r>
+              <a:rPr lang="en-US" sz="2400" dirty="0" smtClean="0"/>
+              <a:t>(</a:t>
+            </a:r>
+            <a:r>
+              <a:rPr lang="en-US" sz="2400" dirty="0" err="1" smtClean="0"/>
+              <a:t>d.utterance</a:t>
+            </a:r>
+            <a:r>
+              <a:rPr lang="en-US" sz="2400" dirty="0" smtClean="0"/>
+              <a:t>);</a:t>
+            </a:r>
+          </a:p>
+          <a:p>
+            <a:r>
+              <a:rPr lang="en-US" sz="2400" dirty="0"/>
+              <a:t> </a:t>
+            </a:r>
+            <a:r>
+              <a:rPr lang="en-US" sz="2400" dirty="0" smtClean="0"/>
+              <a:t>       observe(distribution, </a:t>
+            </a:r>
+            <a:r>
+              <a:rPr lang="en-US" sz="2400" dirty="0" err="1" smtClean="0"/>
+              <a:t>d.world</a:t>
+            </a:r>
+            <a:r>
+              <a:rPr lang="en-US" sz="2400" dirty="0" smtClean="0"/>
+              <a:t>);</a:t>
+            </a:r>
+          </a:p>
+          <a:p>
+            <a:r>
+              <a:rPr lang="en-US" sz="2400" dirty="0"/>
+              <a:t> </a:t>
+            </a:r>
+            <a:r>
+              <a:rPr lang="en-US" sz="2400" dirty="0" smtClean="0"/>
+              <a:t>   })</a:t>
+            </a:r>
+          </a:p>
+          <a:p>
+            <a:r>
+              <a:rPr lang="en-US" sz="2400" dirty="0" smtClean="0"/>
+              <a:t>}, { </a:t>
+            </a:r>
+            <a:r>
+              <a:rPr lang="is-IS" sz="2400" dirty="0" smtClean="0"/>
+              <a:t>… })</a:t>
+            </a:r>
+            <a:endParaRPr lang="en-US" sz="2400" dirty="0" smtClean="0"/>
+          </a:p>
+          <a:p>
+            <a:endParaRPr lang="en-US" sz="2400" dirty="0"/>
           </a:p>
         </p:txBody>
       </p:sp>
     </p:spTree>
     <p:extLst>
       <p:ext uri="{BB962C8B-B14F-4D97-AF65-F5344CB8AC3E}">
-        <p14:creationId xmlns:p14="http://schemas.microsoft.com/office/powerpoint/2010/main" val="1954574685"/>
+        <p14:creationId xmlns:p14="http://schemas.microsoft.com/office/powerpoint/2010/main" val="1749391006"/>
       </p:ext>
     </p:extLst>
   </p:cSld>
@@ -3910,7 +4999,7 @@
           <a:p>
             <a:r>
               <a:rPr lang="en-US" dirty="0" smtClean="0"/>
-              <a:t>Semantic functions (Leon’s slide)</a:t>
+              <a:t>Semantic parser architecture</a:t>
             </a:r>
             <a:endParaRPr lang="en-US" dirty="0"/>
           </a:p>
@@ -3928,8 +5017,92 @@
         </p:nvSpPr>
         <p:spPr/>
         <p:txBody>
-          <a:bodyPr/>
-          <a:lstStyle/>
+          <a:bodyPr>
+            <a:normAutofit fontScale="70000" lnSpcReduction="20000"/>
+          </a:bodyPr>
+          <a:lstStyle/>
+          <a:p>
+            <a:r>
+              <a:rPr lang="en-US" dirty="0" err="1" smtClean="0"/>
+              <a:t>WebPPL</a:t>
+            </a:r>
+            <a:r>
+              <a:rPr lang="en-US" dirty="0" smtClean="0"/>
+              <a:t> package </a:t>
+            </a:r>
+            <a:r>
+              <a:rPr lang="en-US" i="1" dirty="0" err="1" smtClean="0"/>
+              <a:t>semppl</a:t>
+            </a:r>
+            <a:endParaRPr lang="en-US" i="1" dirty="0" smtClean="0"/>
+          </a:p>
+          <a:p>
+            <a:endParaRPr lang="en-US" i="1" dirty="0" smtClean="0"/>
+          </a:p>
+          <a:p>
+            <a:r>
+              <a:rPr lang="en-US" dirty="0" smtClean="0"/>
+              <a:t>Takes a grammar and </a:t>
+            </a:r>
+            <a:r>
+              <a:rPr lang="en-US" dirty="0" err="1" smtClean="0"/>
+              <a:t>params</a:t>
+            </a:r>
+            <a:endParaRPr lang="en-US" dirty="0" smtClean="0"/>
+          </a:p>
+          <a:p>
+            <a:endParaRPr lang="en-US" dirty="0" smtClean="0"/>
+          </a:p>
+          <a:p>
+            <a:r>
+              <a:rPr lang="en-US" dirty="0" smtClean="0"/>
+              <a:t>Chart parsing - start with words, build up to sentence</a:t>
+            </a:r>
+          </a:p>
+          <a:p>
+            <a:endParaRPr lang="en-US" dirty="0" smtClean="0"/>
+          </a:p>
+          <a:p>
+            <a:r>
+              <a:rPr lang="en-US" dirty="0" smtClean="0"/>
+              <a:t>Chart cell has:</a:t>
+            </a:r>
+          </a:p>
+          <a:p>
+            <a:pPr lvl="1"/>
+            <a:r>
+              <a:rPr lang="en-US" dirty="0" smtClean="0"/>
+              <a:t>Set of intermediate parse trees</a:t>
+            </a:r>
+          </a:p>
+          <a:p>
+            <a:pPr lvl="1"/>
+            <a:r>
+              <a:rPr lang="en-US" dirty="0" smtClean="0"/>
+              <a:t>Score for each parse tree</a:t>
+            </a:r>
+          </a:p>
+          <a:p>
+            <a:endParaRPr lang="en-US" dirty="0"/>
+          </a:p>
+          <a:p>
+            <a:r>
+              <a:rPr lang="en-US" dirty="0" smtClean="0"/>
+              <a:t>Results in distribution over parses</a:t>
+            </a:r>
+          </a:p>
+          <a:p>
+            <a:r>
+              <a:rPr lang="en-US" dirty="0" smtClean="0"/>
+              <a:t>PCFG – learns weights, each cell has a set of trees with cumulative scores</a:t>
+            </a:r>
+          </a:p>
+          <a:p>
+            <a:r>
+              <a:rPr lang="en-US" dirty="0" smtClean="0"/>
+              <a:t>Log-linear scoring with features for each rule</a:t>
+            </a:r>
+          </a:p>
           <a:p>
             <a:endParaRPr lang="en-US" dirty="0"/>
           </a:p>
@@ -3938,7 +5111,7 @@
     </p:spTree>
     <p:extLst>
       <p:ext uri="{BB962C8B-B14F-4D97-AF65-F5344CB8AC3E}">
-        <p14:creationId xmlns:p14="http://schemas.microsoft.com/office/powerpoint/2010/main" val="187102010"/>
+        <p14:creationId xmlns:p14="http://schemas.microsoft.com/office/powerpoint/2010/main" val="1867923418"/>
       </p:ext>
     </p:extLst>
   </p:cSld>
@@ -3982,69 +5155,164 @@
           <a:p>
             <a:r>
               <a:rPr lang="en-US" dirty="0" smtClean="0"/>
-              <a:t>Data source</a:t>
+              <a:t>Grammar specification</a:t>
             </a:r>
             <a:endParaRPr lang="en-US" dirty="0"/>
           </a:p>
         </p:txBody>
       </p:sp>
-      <p:sp>
-        <p:nvSpPr>
-          <p:cNvPr id="3" name="Content Placeholder 2"/>
-          <p:cNvSpPr>
-            <a:spLocks noGrp="1"/>
-          </p:cNvSpPr>
-          <p:nvPr>
-            <p:ph idx="1"/>
-          </p:nvPr>
-        </p:nvSpPr>
-        <p:spPr/>
-        <p:txBody>
-          <a:bodyPr/>
-          <a:lstStyle/>
-          <a:p>
-            <a:r>
-              <a:rPr lang="en-US" dirty="0" smtClean="0"/>
-              <a:t>Ground truth model – fixed semantics</a:t>
-            </a:r>
-          </a:p>
-          <a:p>
-            <a:r>
-              <a:rPr lang="en-US" dirty="0" smtClean="0"/>
-              <a:t>Generate samples from ground truth</a:t>
-            </a:r>
-          </a:p>
-          <a:p>
-            <a:r>
-              <a:rPr lang="en-US" dirty="0" smtClean="0"/>
-              <a:t>Triples of utterance, world, context</a:t>
-            </a:r>
-          </a:p>
-          <a:p>
-            <a:r>
-              <a:rPr lang="en-US" dirty="0" err="1" smtClean="0"/>
-              <a:t>mapData</a:t>
-            </a:r>
-            <a:r>
-              <a:rPr lang="en-US" dirty="0" smtClean="0"/>
-              <a:t> in </a:t>
-            </a:r>
-            <a:r>
-              <a:rPr lang="en-US" dirty="0" err="1" smtClean="0"/>
-              <a:t>variational</a:t>
-            </a:r>
-            <a:r>
-              <a:rPr lang="en-US" dirty="0" smtClean="0"/>
-              <a:t> inference</a:t>
-            </a:r>
-            <a:endParaRPr lang="en-US" dirty="0"/>
-          </a:p>
-        </p:txBody>
-      </p:sp>
+      <mc:AlternateContent xmlns:mc="http://schemas.openxmlformats.org/markup-compatibility/2006">
+        <mc:Choice xmlns:a14="http://schemas.microsoft.com/office/drawing/2010/main" Requires="a14">
+          <p:sp>
+            <p:nvSpPr>
+              <p:cNvPr id="3" name="Content Placeholder 2"/>
+              <p:cNvSpPr>
+                <a:spLocks noGrp="1"/>
+              </p:cNvSpPr>
+              <p:nvPr>
+                <p:ph idx="1"/>
+              </p:nvPr>
+            </p:nvSpPr>
+            <p:spPr/>
+            <p:txBody>
+              <a:bodyPr>
+                <a:normAutofit/>
+              </a:bodyPr>
+              <a:lstStyle/>
+              <a:p>
+                <a:r>
+                  <a:rPr lang="en-US" dirty="0" smtClean="0"/>
+                  <a:t>PCFG (probabilistic context free grammar)</a:t>
+                </a:r>
+              </a:p>
+              <a:p>
+                <a:endParaRPr lang="en-US" dirty="0" smtClean="0"/>
+              </a:p>
+              <a:p>
+                <a:r>
+                  <a:rPr lang="en-US" dirty="0" smtClean="0"/>
+                  <a:t>Each rule:</a:t>
+                </a:r>
+              </a:p>
+              <a:p>
+                <a:pPr lvl="1"/>
+                <a:r>
+                  <a:rPr lang="en-US" dirty="0" smtClean="0"/>
+                  <a:t>LHS</a:t>
+                </a:r>
+              </a:p>
+              <a:p>
+                <a:pPr lvl="1"/>
+                <a:r>
+                  <a:rPr lang="en-US" dirty="0" smtClean="0"/>
+                  <a:t>RHS</a:t>
+                </a:r>
+              </a:p>
+              <a:p>
+                <a:pPr lvl="1"/>
+                <a:r>
+                  <a:rPr lang="en-US" dirty="0" smtClean="0"/>
+                  <a:t>Semantic function</a:t>
+                </a:r>
+              </a:p>
+              <a:p>
+                <a:r>
+                  <a:rPr lang="en-US" dirty="0" smtClean="0"/>
+                  <a:t>Parser assigns weight </a:t>
+                </a:r>
+                <a14:m>
+                  <m:oMath xmlns:m="http://schemas.openxmlformats.org/officeDocument/2006/math">
+                    <m:sSub>
+                      <m:sSubPr>
+                        <m:ctrlPr>
+                          <a:rPr lang="en-US" b="0" i="1" smtClean="0">
+                            <a:latin typeface="Cambria Math" charset="0"/>
+                          </a:rPr>
+                        </m:ctrlPr>
+                      </m:sSubPr>
+                      <m:e>
+                        <m:r>
+                          <a:rPr lang="en-US" b="0" i="1" smtClean="0">
+                            <a:latin typeface="Cambria Math" charset="0"/>
+                          </a:rPr>
+                          <m:t>𝜔</m:t>
+                        </m:r>
+                      </m:e>
+                      <m:sub>
+                        <m:r>
+                          <a:rPr lang="en-US" b="0" i="1" smtClean="0">
+                            <a:latin typeface="Cambria Math" charset="0"/>
+                          </a:rPr>
+                          <m:t>𝑟</m:t>
+                        </m:r>
+                      </m:sub>
+                    </m:sSub>
+                  </m:oMath>
+                </a14:m>
+                <a:r>
+                  <a:rPr lang="en-US" i="1" dirty="0" smtClean="0"/>
+                  <a:t> </a:t>
+                </a:r>
+                <a:r>
+                  <a:rPr lang="en-US" dirty="0" smtClean="0"/>
+                  <a:t>for each rule </a:t>
+                </a:r>
+                <a14:m>
+                  <m:oMath xmlns:m="http://schemas.openxmlformats.org/officeDocument/2006/math">
+                    <m:r>
+                      <a:rPr lang="en-US" b="0" i="1" smtClean="0">
+                        <a:latin typeface="Cambria Math" charset="0"/>
+                      </a:rPr>
+                      <m:t>𝑟</m:t>
+                    </m:r>
+                  </m:oMath>
+                </a14:m>
+                <a:endParaRPr lang="en-US" dirty="0" smtClean="0"/>
+              </a:p>
+              <a:p>
+                <a:endParaRPr lang="en-US" dirty="0" smtClean="0"/>
+              </a:p>
+            </p:txBody>
+          </p:sp>
+        </mc:Choice>
+        <mc:Fallback>
+          <p:sp>
+            <p:nvSpPr>
+              <p:cNvPr id="3" name="Content Placeholder 2"/>
+              <p:cNvSpPr>
+                <a:spLocks noGrp="1" noRot="1" noChangeAspect="1" noMove="1" noResize="1" noEditPoints="1" noAdjustHandles="1" noChangeArrowheads="1" noChangeShapeType="1" noTextEdit="1"/>
+              </p:cNvSpPr>
+              <p:nvPr>
+                <p:ph idx="1"/>
+              </p:nvPr>
+            </p:nvSpPr>
+            <p:spPr>
+              <a:blipFill rotWithShape="0">
+                <a:blip r:embed="rId2"/>
+                <a:stretch>
+                  <a:fillRect l="-1043" t="-2241"/>
+                </a:stretch>
+              </a:blipFill>
+            </p:spPr>
+            <p:txBody>
+              <a:bodyPr/>
+              <a:lstStyle/>
+              <a:p>
+                <a:r>
+                  <a:rPr lang="en-US">
+                    <a:noFill/>
+                  </a:rPr>
+                  <a:t> </a:t>
+                </a:r>
+              </a:p>
+            </p:txBody>
+          </p:sp>
+        </mc:Fallback>
+      </mc:AlternateContent>
     </p:spTree>
     <p:extLst>
       <p:ext uri="{BB962C8B-B14F-4D97-AF65-F5344CB8AC3E}">
-        <p14:creationId xmlns:p14="http://schemas.microsoft.com/office/powerpoint/2010/main" val="479382636"/>
+        <p14:creationId xmlns:p14="http://schemas.microsoft.com/office/powerpoint/2010/main" val="1954574685"/>
       </p:ext>
     </p:extLst>
   </p:cSld>

</xml_diff>